<commit_message>
Anonymous methods and lambda expressions
</commit_message>
<xml_diff>
--- a/ToDo.Console/Lectures/Collections.pptx
+++ b/ToDo.Console/Lectures/Collections.pptx
@@ -27,6 +27,9 @@
     <p:sldId id="279" r:id="rId24"/>
     <p:sldId id="280" r:id="rId25"/>
     <p:sldId id="281" r:id="rId26"/>
+    <p:sldId id="282" r:id="rId27"/>
+    <p:sldId id="284" r:id="rId28"/>
+    <p:sldId id="285" r:id="rId29"/>
   </p:sldIdLst>
   <p:sldSz cx="12192000" cy="6858000"/>
   <p:notesSz cx="6858000" cy="9144000"/>
@@ -359,7 +362,7 @@
           <a:p>
             <a:fld id="{A35E2E98-A03A-4DC7-9B11-0B5AC1B3BAD8}" type="datetimeFigureOut">
               <a:rPr lang="en-US" smtClean="0"/>
-              <a:t>06-Mar-24</a:t>
+              <a:t>07-Mar-24</a:t>
             </a:fld>
             <a:endParaRPr lang="en-US"/>
           </a:p>
@@ -567,7 +570,7 @@
           <a:p>
             <a:fld id="{A35E2E98-A03A-4DC7-9B11-0B5AC1B3BAD8}" type="datetimeFigureOut">
               <a:rPr lang="en-US" smtClean="0"/>
-              <a:t>06-Mar-24</a:t>
+              <a:t>07-Mar-24</a:t>
             </a:fld>
             <a:endParaRPr lang="en-US"/>
           </a:p>
@@ -823,7 +826,7 @@
           <a:p>
             <a:fld id="{A35E2E98-A03A-4DC7-9B11-0B5AC1B3BAD8}" type="datetimeFigureOut">
               <a:rPr lang="en-US" smtClean="0"/>
-              <a:t>06-Mar-24</a:t>
+              <a:t>07-Mar-24</a:t>
             </a:fld>
             <a:endParaRPr lang="en-US"/>
           </a:p>
@@ -997,7 +1000,7 @@
           <a:p>
             <a:fld id="{A35E2E98-A03A-4DC7-9B11-0B5AC1B3BAD8}" type="datetimeFigureOut">
               <a:rPr lang="en-US" smtClean="0"/>
-              <a:t>06-Mar-24</a:t>
+              <a:t>07-Mar-24</a:t>
             </a:fld>
             <a:endParaRPr lang="en-US"/>
           </a:p>
@@ -1340,7 +1343,7 @@
           <a:p>
             <a:fld id="{A35E2E98-A03A-4DC7-9B11-0B5AC1B3BAD8}" type="datetimeFigureOut">
               <a:rPr lang="en-US" smtClean="0"/>
-              <a:t>06-Mar-24</a:t>
+              <a:t>07-Mar-24</a:t>
             </a:fld>
             <a:endParaRPr lang="en-US"/>
           </a:p>
@@ -1615,7 +1618,7 @@
           <a:p>
             <a:fld id="{A35E2E98-A03A-4DC7-9B11-0B5AC1B3BAD8}" type="datetimeFigureOut">
               <a:rPr lang="en-US" smtClean="0"/>
-              <a:t>06-Mar-24</a:t>
+              <a:t>07-Mar-24</a:t>
             </a:fld>
             <a:endParaRPr lang="en-US"/>
           </a:p>
@@ -1994,7 +1997,7 @@
           <a:p>
             <a:fld id="{A35E2E98-A03A-4DC7-9B11-0B5AC1B3BAD8}" type="datetimeFigureOut">
               <a:rPr lang="en-US" smtClean="0"/>
-              <a:t>06-Mar-24</a:t>
+              <a:t>07-Mar-24</a:t>
             </a:fld>
             <a:endParaRPr lang="en-US"/>
           </a:p>
@@ -2112,7 +2115,7 @@
           <a:p>
             <a:fld id="{A35E2E98-A03A-4DC7-9B11-0B5AC1B3BAD8}" type="datetimeFigureOut">
               <a:rPr lang="en-US" smtClean="0"/>
-              <a:t>06-Mar-24</a:t>
+              <a:t>07-Mar-24</a:t>
             </a:fld>
             <a:endParaRPr lang="en-US"/>
           </a:p>
@@ -2283,7 +2286,7 @@
           <a:p>
             <a:fld id="{A35E2E98-A03A-4DC7-9B11-0B5AC1B3BAD8}" type="datetimeFigureOut">
               <a:rPr lang="en-US" smtClean="0"/>
-              <a:t>06-Mar-24</a:t>
+              <a:t>07-Mar-24</a:t>
             </a:fld>
             <a:endParaRPr lang="en-US"/>
           </a:p>
@@ -2637,7 +2640,7 @@
           <a:p>
             <a:fld id="{A35E2E98-A03A-4DC7-9B11-0B5AC1B3BAD8}" type="datetimeFigureOut">
               <a:rPr lang="en-US" smtClean="0"/>
-              <a:t>06-Mar-24</a:t>
+              <a:t>07-Mar-24</a:t>
             </a:fld>
             <a:endParaRPr lang="en-US"/>
           </a:p>
@@ -3019,7 +3022,7 @@
           <a:p>
             <a:fld id="{A35E2E98-A03A-4DC7-9B11-0B5AC1B3BAD8}" type="datetimeFigureOut">
               <a:rPr lang="en-US" smtClean="0"/>
-              <a:t>06-Mar-24</a:t>
+              <a:t>07-Mar-24</a:t>
             </a:fld>
             <a:endParaRPr lang="en-US"/>
           </a:p>
@@ -3306,7 +3309,7 @@
           <a:p>
             <a:fld id="{A35E2E98-A03A-4DC7-9B11-0B5AC1B3BAD8}" type="datetimeFigureOut">
               <a:rPr lang="en-US" smtClean="0"/>
-              <a:t>06-Mar-24</a:t>
+              <a:t>07-Mar-24</a:t>
             </a:fld>
             <a:endParaRPr lang="en-US"/>
           </a:p>
@@ -6070,6 +6073,376 @@
 </p:sld>
 </file>
 
+<file path=ppt/slides/slide23.xml><?xml version="1.0" encoding="utf-8"?>
+<p:sld xmlns:a="http://schemas.openxmlformats.org/drawingml/2006/main" xmlns:r="http://schemas.openxmlformats.org/officeDocument/2006/relationships" xmlns:p="http://schemas.openxmlformats.org/presentationml/2006/main">
+  <p:cSld>
+    <p:spTree>
+      <p:nvGrpSpPr>
+        <p:cNvPr id="1" name=""/>
+        <p:cNvGrpSpPr/>
+        <p:nvPr/>
+      </p:nvGrpSpPr>
+      <p:grpSpPr>
+        <a:xfrm>
+          <a:off x="0" y="0"/>
+          <a:ext cx="0" cy="0"/>
+          <a:chOff x="0" y="0"/>
+          <a:chExt cx="0" cy="0"/>
+        </a:xfrm>
+      </p:grpSpPr>
+      <p:sp>
+        <p:nvSpPr>
+          <p:cNvPr id="2" name="Title 1">
+            <a:extLst>
+              <a:ext uri="{FF2B5EF4-FFF2-40B4-BE49-F238E27FC236}">
+                <a16:creationId xmlns:a16="http://schemas.microsoft.com/office/drawing/2014/main" id="{E929DBD5-3237-28BD-C3BD-1CC28FF16EBC}"/>
+              </a:ext>
+            </a:extLst>
+          </p:cNvPr>
+          <p:cNvSpPr>
+            <a:spLocks noGrp="1"/>
+          </p:cNvSpPr>
+          <p:nvPr>
+            <p:ph type="title"/>
+          </p:nvPr>
+        </p:nvSpPr>
+        <p:spPr/>
+        <p:txBody>
+          <a:bodyPr/>
+          <a:lstStyle/>
+          <a:p>
+            <a:r>
+              <a:rPr lang="en-US" b="1" dirty="0">
+                <a:solidFill>
+                  <a:srgbClr val="FF0000"/>
+                </a:solidFill>
+                <a:ea typeface="Cambria" panose="02040503050406030204" pitchFamily="18" charset="0"/>
+              </a:rPr>
+              <a:t>Delegates</a:t>
+            </a:r>
+          </a:p>
+        </p:txBody>
+      </p:sp>
+      <p:sp>
+        <p:nvSpPr>
+          <p:cNvPr id="3" name="Content Placeholder 2">
+            <a:extLst>
+              <a:ext uri="{FF2B5EF4-FFF2-40B4-BE49-F238E27FC236}">
+                <a16:creationId xmlns:a16="http://schemas.microsoft.com/office/drawing/2014/main" id="{4E5DF1B6-2300-1E04-4C3B-79087D7D0045}"/>
+              </a:ext>
+            </a:extLst>
+          </p:cNvPr>
+          <p:cNvSpPr>
+            <a:spLocks noGrp="1"/>
+          </p:cNvSpPr>
+          <p:nvPr>
+            <p:ph idx="1"/>
+          </p:nvPr>
+        </p:nvSpPr>
+        <p:spPr/>
+        <p:txBody>
+          <a:bodyPr>
+            <a:normAutofit/>
+          </a:bodyPr>
+          <a:lstStyle/>
+          <a:p>
+            <a:pPr lvl="1">
+              <a:buFont typeface="Arial" panose="020B0604020202020204" pitchFamily="34" charset="0"/>
+              <a:buChar char="•"/>
+            </a:pPr>
+            <a:r>
+              <a:rPr lang="en-US" sz="2000" dirty="0"/>
+              <a:t>Generic delegates</a:t>
+            </a:r>
+          </a:p>
+          <a:p>
+            <a:pPr lvl="2">
+              <a:buFont typeface="Arial" panose="020B0604020202020204" pitchFamily="34" charset="0"/>
+              <a:buChar char="•"/>
+            </a:pPr>
+            <a:r>
+              <a:rPr lang="en-US" sz="1600" dirty="0"/>
+              <a:t>If we have five methods, we can create five delegates. But when we work on large projects, we may have to create fifty or five hundred delegates. If we want to encapsulate them by using delegates, then we must create fifty or five hundred delegates. That will really increase the size of our code and make our application slow.</a:t>
+            </a:r>
+          </a:p>
+          <a:p>
+            <a:pPr lvl="2">
+              <a:buFont typeface="Arial" panose="020B0604020202020204" pitchFamily="34" charset="0"/>
+              <a:buChar char="•"/>
+            </a:pPr>
+            <a:r>
+              <a:rPr lang="en-US" sz="1600" dirty="0"/>
+              <a:t>This ca be addressed with generic delegates</a:t>
+            </a:r>
+          </a:p>
+          <a:p>
+            <a:pPr lvl="1">
+              <a:buFont typeface="Arial" panose="020B0604020202020204" pitchFamily="34" charset="0"/>
+              <a:buChar char="•"/>
+            </a:pPr>
+            <a:endParaRPr lang="en-US" sz="1600" dirty="0"/>
+          </a:p>
+        </p:txBody>
+      </p:sp>
+    </p:spTree>
+    <p:extLst>
+      <p:ext uri="{BB962C8B-B14F-4D97-AF65-F5344CB8AC3E}">
+        <p14:creationId xmlns:p14="http://schemas.microsoft.com/office/powerpoint/2010/main" val="4272555248"/>
+      </p:ext>
+    </p:extLst>
+  </p:cSld>
+  <p:clrMapOvr>
+    <a:masterClrMapping/>
+  </p:clrMapOvr>
+</p:sld>
+</file>
+
+<file path=ppt/slides/slide24.xml><?xml version="1.0" encoding="utf-8"?>
+<p:sld xmlns:a="http://schemas.openxmlformats.org/drawingml/2006/main" xmlns:r="http://schemas.openxmlformats.org/officeDocument/2006/relationships" xmlns:p="http://schemas.openxmlformats.org/presentationml/2006/main">
+  <p:cSld>
+    <p:spTree>
+      <p:nvGrpSpPr>
+        <p:cNvPr id="1" name=""/>
+        <p:cNvGrpSpPr/>
+        <p:nvPr/>
+      </p:nvGrpSpPr>
+      <p:grpSpPr>
+        <a:xfrm>
+          <a:off x="0" y="0"/>
+          <a:ext cx="0" cy="0"/>
+          <a:chOff x="0" y="0"/>
+          <a:chExt cx="0" cy="0"/>
+        </a:xfrm>
+      </p:grpSpPr>
+      <p:sp>
+        <p:nvSpPr>
+          <p:cNvPr id="2" name="Title 1">
+            <a:extLst>
+              <a:ext uri="{FF2B5EF4-FFF2-40B4-BE49-F238E27FC236}">
+                <a16:creationId xmlns:a16="http://schemas.microsoft.com/office/drawing/2014/main" id="{E929DBD5-3237-28BD-C3BD-1CC28FF16EBC}"/>
+              </a:ext>
+            </a:extLst>
+          </p:cNvPr>
+          <p:cNvSpPr>
+            <a:spLocks noGrp="1"/>
+          </p:cNvSpPr>
+          <p:nvPr>
+            <p:ph type="title"/>
+          </p:nvPr>
+        </p:nvSpPr>
+        <p:spPr/>
+        <p:txBody>
+          <a:bodyPr/>
+          <a:lstStyle/>
+          <a:p>
+            <a:r>
+              <a:rPr lang="en-US" b="1" dirty="0">
+                <a:solidFill>
+                  <a:srgbClr val="FF0000"/>
+                </a:solidFill>
+                <a:ea typeface="Cambria" panose="02040503050406030204" pitchFamily="18" charset="0"/>
+              </a:rPr>
+              <a:t>Anonymous Methods</a:t>
+            </a:r>
+          </a:p>
+        </p:txBody>
+      </p:sp>
+      <p:sp>
+        <p:nvSpPr>
+          <p:cNvPr id="3" name="Content Placeholder 2">
+            <a:extLst>
+              <a:ext uri="{FF2B5EF4-FFF2-40B4-BE49-F238E27FC236}">
+                <a16:creationId xmlns:a16="http://schemas.microsoft.com/office/drawing/2014/main" id="{4E5DF1B6-2300-1E04-4C3B-79087D7D0045}"/>
+              </a:ext>
+            </a:extLst>
+          </p:cNvPr>
+          <p:cNvSpPr>
+            <a:spLocks noGrp="1"/>
+          </p:cNvSpPr>
+          <p:nvPr>
+            <p:ph idx="1"/>
+          </p:nvPr>
+        </p:nvSpPr>
+        <p:spPr/>
+        <p:txBody>
+          <a:bodyPr>
+            <a:normAutofit/>
+          </a:bodyPr>
+          <a:lstStyle/>
+          <a:p>
+            <a:pPr lvl="1">
+              <a:buFont typeface="Arial" panose="020B0604020202020204" pitchFamily="34" charset="0"/>
+              <a:buChar char="•"/>
+            </a:pPr>
+            <a:r>
+              <a:rPr lang="en-US" sz="2000" dirty="0"/>
+              <a:t>The anonymous methods are defined using the delegate keyword</a:t>
+            </a:r>
+          </a:p>
+          <a:p>
+            <a:pPr lvl="1">
+              <a:buFont typeface="Arial" panose="020B0604020202020204" pitchFamily="34" charset="0"/>
+              <a:buChar char="•"/>
+            </a:pPr>
+            <a:r>
+              <a:rPr lang="en-US" sz="2000" dirty="0"/>
+              <a:t>An anonymous method must be assigned to a delegate type.</a:t>
+            </a:r>
+          </a:p>
+          <a:p>
+            <a:pPr lvl="1">
+              <a:buFont typeface="Arial" panose="020B0604020202020204" pitchFamily="34" charset="0"/>
+              <a:buChar char="•"/>
+            </a:pPr>
+            <a:r>
+              <a:rPr lang="en-US" sz="2000" dirty="0"/>
+              <a:t>This method can access outer variables or functions except for the outer function ref and out parameter.</a:t>
+            </a:r>
+          </a:p>
+          <a:p>
+            <a:pPr lvl="1">
+              <a:buFont typeface="Arial" panose="020B0604020202020204" pitchFamily="34" charset="0"/>
+              <a:buChar char="•"/>
+            </a:pPr>
+            <a:r>
+              <a:rPr lang="en-US" sz="2000" dirty="0"/>
+              <a:t>An anonymous method can be passed as a parameter.</a:t>
+            </a:r>
+            <a:endParaRPr lang="en-US" sz="1600" dirty="0"/>
+          </a:p>
+        </p:txBody>
+      </p:sp>
+    </p:spTree>
+    <p:extLst>
+      <p:ext uri="{BB962C8B-B14F-4D97-AF65-F5344CB8AC3E}">
+        <p14:creationId xmlns:p14="http://schemas.microsoft.com/office/powerpoint/2010/main" val="3615019676"/>
+      </p:ext>
+    </p:extLst>
+  </p:cSld>
+  <p:clrMapOvr>
+    <a:masterClrMapping/>
+  </p:clrMapOvr>
+</p:sld>
+</file>
+
+<file path=ppt/slides/slide25.xml><?xml version="1.0" encoding="utf-8"?>
+<p:sld xmlns:a="http://schemas.openxmlformats.org/drawingml/2006/main" xmlns:r="http://schemas.openxmlformats.org/officeDocument/2006/relationships" xmlns:p="http://schemas.openxmlformats.org/presentationml/2006/main">
+  <p:cSld>
+    <p:spTree>
+      <p:nvGrpSpPr>
+        <p:cNvPr id="1" name=""/>
+        <p:cNvGrpSpPr/>
+        <p:nvPr/>
+      </p:nvGrpSpPr>
+      <p:grpSpPr>
+        <a:xfrm>
+          <a:off x="0" y="0"/>
+          <a:ext cx="0" cy="0"/>
+          <a:chOff x="0" y="0"/>
+          <a:chExt cx="0" cy="0"/>
+        </a:xfrm>
+      </p:grpSpPr>
+      <p:sp>
+        <p:nvSpPr>
+          <p:cNvPr id="2" name="Title 1">
+            <a:extLst>
+              <a:ext uri="{FF2B5EF4-FFF2-40B4-BE49-F238E27FC236}">
+                <a16:creationId xmlns:a16="http://schemas.microsoft.com/office/drawing/2014/main" id="{E929DBD5-3237-28BD-C3BD-1CC28FF16EBC}"/>
+              </a:ext>
+            </a:extLst>
+          </p:cNvPr>
+          <p:cNvSpPr>
+            <a:spLocks noGrp="1"/>
+          </p:cNvSpPr>
+          <p:nvPr>
+            <p:ph type="title"/>
+          </p:nvPr>
+        </p:nvSpPr>
+        <p:spPr/>
+        <p:txBody>
+          <a:bodyPr/>
+          <a:lstStyle/>
+          <a:p>
+            <a:r>
+              <a:rPr lang="en-US" b="1" dirty="0">
+                <a:solidFill>
+                  <a:srgbClr val="FF0000"/>
+                </a:solidFill>
+                <a:ea typeface="Cambria" panose="02040503050406030204" pitchFamily="18" charset="0"/>
+              </a:rPr>
+              <a:t>Lambda Expressions</a:t>
+            </a:r>
+          </a:p>
+        </p:txBody>
+      </p:sp>
+      <p:sp>
+        <p:nvSpPr>
+          <p:cNvPr id="3" name="Content Placeholder 2">
+            <a:extLst>
+              <a:ext uri="{FF2B5EF4-FFF2-40B4-BE49-F238E27FC236}">
+                <a16:creationId xmlns:a16="http://schemas.microsoft.com/office/drawing/2014/main" id="{4E5DF1B6-2300-1E04-4C3B-79087D7D0045}"/>
+              </a:ext>
+            </a:extLst>
+          </p:cNvPr>
+          <p:cNvSpPr>
+            <a:spLocks noGrp="1"/>
+          </p:cNvSpPr>
+          <p:nvPr>
+            <p:ph idx="1"/>
+          </p:nvPr>
+        </p:nvSpPr>
+        <p:spPr/>
+        <p:txBody>
+          <a:bodyPr>
+            <a:normAutofit/>
+          </a:bodyPr>
+          <a:lstStyle/>
+          <a:p>
+            <a:pPr lvl="1">
+              <a:buFont typeface="Arial" panose="020B0604020202020204" pitchFamily="34" charset="0"/>
+              <a:buChar char="•"/>
+            </a:pPr>
+            <a:r>
+              <a:rPr lang="en-US" sz="2000" dirty="0"/>
+              <a:t>The Lambda Expression in C# is the shorthand for writing the Anonymous Function. </a:t>
+            </a:r>
+          </a:p>
+          <a:p>
+            <a:pPr lvl="1">
+              <a:buFont typeface="Arial" panose="020B0604020202020204" pitchFamily="34" charset="0"/>
+              <a:buChar char="•"/>
+            </a:pPr>
+            <a:r>
+              <a:rPr lang="en-US" sz="2000" dirty="0"/>
+              <a:t>So, we can say that the Lambda Expression is nothing but to simplify the anonymous function in C# and,</a:t>
+            </a:r>
+          </a:p>
+          <a:p>
+            <a:pPr lvl="1">
+              <a:buFont typeface="Arial" panose="020B0604020202020204" pitchFamily="34" charset="0"/>
+              <a:buChar char="•"/>
+            </a:pPr>
+            <a:r>
+              <a:rPr lang="en-US" sz="2000" dirty="0"/>
+              <a:t>we also discussed that Anonymous Functions are related to delegate and they are created by using the delegate keyword</a:t>
+            </a:r>
+            <a:endParaRPr lang="en-US" sz="1600" dirty="0"/>
+          </a:p>
+        </p:txBody>
+      </p:sp>
+    </p:spTree>
+    <p:extLst>
+      <p:ext uri="{BB962C8B-B14F-4D97-AF65-F5344CB8AC3E}">
+        <p14:creationId xmlns:p14="http://schemas.microsoft.com/office/powerpoint/2010/main" val="2971057592"/>
+      </p:ext>
+    </p:extLst>
+  </p:cSld>
+  <p:clrMapOvr>
+    <a:masterClrMapping/>
+  </p:clrMapOvr>
+</p:sld>
+</file>
+
 <file path=ppt/slides/slide3.xml><?xml version="1.0" encoding="utf-8"?>
 <p:sld xmlns:a="http://schemas.openxmlformats.org/drawingml/2006/main" xmlns:r="http://schemas.openxmlformats.org/officeDocument/2006/relationships" xmlns:p="http://schemas.openxmlformats.org/presentationml/2006/main">
   <p:cSld>
@@ -7432,20 +7805,20 @@
 </file>
 
 <file path=customXml/item1.xml><?xml version="1.0" encoding="utf-8"?>
+<p:properties xmlns:p="http://schemas.microsoft.com/office/2006/metadata/properties" xmlns:xsi="http://www.w3.org/2001/XMLSchema-instance" xmlns:pc="http://schemas.microsoft.com/office/infopath/2007/PartnerControls">
+  <documentManagement>
+    <_activity xmlns="566b2847-4b6b-412c-8fbd-07bb6b8172bd" xsi:nil="true"/>
+  </documentManagement>
+</p:properties>
+</file>
+
+<file path=customXml/item2.xml><?xml version="1.0" encoding="utf-8"?>
 <?mso-contentType ?>
 <FormTemplates xmlns="http://schemas.microsoft.com/sharepoint/v3/contenttype/forms">
   <Display>DocumentLibraryForm</Display>
   <Edit>DocumentLibraryForm</Edit>
   <New>DocumentLibraryForm</New>
 </FormTemplates>
-</file>
-
-<file path=customXml/item2.xml><?xml version="1.0" encoding="utf-8"?>
-<p:properties xmlns:p="http://schemas.microsoft.com/office/2006/metadata/properties" xmlns:xsi="http://www.w3.org/2001/XMLSchema-instance" xmlns:pc="http://schemas.microsoft.com/office/infopath/2007/PartnerControls">
-  <documentManagement>
-    <_activity xmlns="566b2847-4b6b-412c-8fbd-07bb6b8172bd" xsi:nil="true"/>
-  </documentManagement>
-</p:properties>
 </file>
 
 <file path=customXml/item3.xml><?xml version="1.0" encoding="utf-8"?>
@@ -7702,14 +8075,6 @@
 </file>
 
 <file path=customXml/itemProps1.xml><?xml version="1.0" encoding="utf-8"?>
-<ds:datastoreItem xmlns:ds="http://schemas.openxmlformats.org/officeDocument/2006/customXml" ds:itemID="{69A0BA6B-9DB3-4B70-9A26-0692F72ACC52}">
-  <ds:schemaRefs>
-    <ds:schemaRef ds:uri="http://schemas.microsoft.com/sharepoint/v3/contenttype/forms"/>
-  </ds:schemaRefs>
-</ds:datastoreItem>
-</file>
-
-<file path=customXml/itemProps2.xml><?xml version="1.0" encoding="utf-8"?>
 <ds:datastoreItem xmlns:ds="http://schemas.openxmlformats.org/officeDocument/2006/customXml" ds:itemID="{8C7DF143-C06A-47E7-95B7-EA38AAD4A15F}">
   <ds:schemaRefs>
     <ds:schemaRef ds:uri="99f9aa81-7c22-4edc-9746-523722551add"/>
@@ -7722,6 +8087,14 @@
     <ds:schemaRef ds:uri="http://schemas.microsoft.com/office/2006/metadata/properties"/>
     <ds:schemaRef ds:uri="http://purl.org/dc/dcmitype/"/>
     <ds:schemaRef ds:uri="566b2847-4b6b-412c-8fbd-07bb6b8172bd"/>
+  </ds:schemaRefs>
+</ds:datastoreItem>
+</file>
+
+<file path=customXml/itemProps2.xml><?xml version="1.0" encoding="utf-8"?>
+<ds:datastoreItem xmlns:ds="http://schemas.openxmlformats.org/officeDocument/2006/customXml" ds:itemID="{69A0BA6B-9DB3-4B70-9A26-0692F72ACC52}">
+  <ds:schemaRefs>
+    <ds:schemaRef ds:uri="http://schemas.microsoft.com/sharepoint/v3/contenttype/forms"/>
   </ds:schemaRefs>
 </ds:datastoreItem>
 </file>

</xml_diff>

<commit_message>
Func Action Predicate delgates
</commit_message>
<xml_diff>
--- a/ToDo.Console/Lectures/Collections.pptx
+++ b/ToDo.Console/Lectures/Collections.pptx
@@ -30,6 +30,7 @@
     <p:sldId id="282" r:id="rId27"/>
     <p:sldId id="284" r:id="rId28"/>
     <p:sldId id="285" r:id="rId29"/>
+    <p:sldId id="286" r:id="rId30"/>
   </p:sldIdLst>
   <p:sldSz cx="12192000" cy="6858000"/>
   <p:notesSz cx="6858000" cy="9144000"/>
@@ -362,7 +363,7 @@
           <a:p>
             <a:fld id="{A35E2E98-A03A-4DC7-9B11-0B5AC1B3BAD8}" type="datetimeFigureOut">
               <a:rPr lang="en-US" smtClean="0"/>
-              <a:t>07-Mar-24</a:t>
+              <a:t>08-Mar-24</a:t>
             </a:fld>
             <a:endParaRPr lang="en-US"/>
           </a:p>
@@ -570,7 +571,7 @@
           <a:p>
             <a:fld id="{A35E2E98-A03A-4DC7-9B11-0B5AC1B3BAD8}" type="datetimeFigureOut">
               <a:rPr lang="en-US" smtClean="0"/>
-              <a:t>07-Mar-24</a:t>
+              <a:t>08-Mar-24</a:t>
             </a:fld>
             <a:endParaRPr lang="en-US"/>
           </a:p>
@@ -826,7 +827,7 @@
           <a:p>
             <a:fld id="{A35E2E98-A03A-4DC7-9B11-0B5AC1B3BAD8}" type="datetimeFigureOut">
               <a:rPr lang="en-US" smtClean="0"/>
-              <a:t>07-Mar-24</a:t>
+              <a:t>08-Mar-24</a:t>
             </a:fld>
             <a:endParaRPr lang="en-US"/>
           </a:p>
@@ -1000,7 +1001,7 @@
           <a:p>
             <a:fld id="{A35E2E98-A03A-4DC7-9B11-0B5AC1B3BAD8}" type="datetimeFigureOut">
               <a:rPr lang="en-US" smtClean="0"/>
-              <a:t>07-Mar-24</a:t>
+              <a:t>08-Mar-24</a:t>
             </a:fld>
             <a:endParaRPr lang="en-US"/>
           </a:p>
@@ -1343,7 +1344,7 @@
           <a:p>
             <a:fld id="{A35E2E98-A03A-4DC7-9B11-0B5AC1B3BAD8}" type="datetimeFigureOut">
               <a:rPr lang="en-US" smtClean="0"/>
-              <a:t>07-Mar-24</a:t>
+              <a:t>08-Mar-24</a:t>
             </a:fld>
             <a:endParaRPr lang="en-US"/>
           </a:p>
@@ -1618,7 +1619,7 @@
           <a:p>
             <a:fld id="{A35E2E98-A03A-4DC7-9B11-0B5AC1B3BAD8}" type="datetimeFigureOut">
               <a:rPr lang="en-US" smtClean="0"/>
-              <a:t>07-Mar-24</a:t>
+              <a:t>08-Mar-24</a:t>
             </a:fld>
             <a:endParaRPr lang="en-US"/>
           </a:p>
@@ -1997,7 +1998,7 @@
           <a:p>
             <a:fld id="{A35E2E98-A03A-4DC7-9B11-0B5AC1B3BAD8}" type="datetimeFigureOut">
               <a:rPr lang="en-US" smtClean="0"/>
-              <a:t>07-Mar-24</a:t>
+              <a:t>08-Mar-24</a:t>
             </a:fld>
             <a:endParaRPr lang="en-US"/>
           </a:p>
@@ -2115,7 +2116,7 @@
           <a:p>
             <a:fld id="{A35E2E98-A03A-4DC7-9B11-0B5AC1B3BAD8}" type="datetimeFigureOut">
               <a:rPr lang="en-US" smtClean="0"/>
-              <a:t>07-Mar-24</a:t>
+              <a:t>08-Mar-24</a:t>
             </a:fld>
             <a:endParaRPr lang="en-US"/>
           </a:p>
@@ -2286,7 +2287,7 @@
           <a:p>
             <a:fld id="{A35E2E98-A03A-4DC7-9B11-0B5AC1B3BAD8}" type="datetimeFigureOut">
               <a:rPr lang="en-US" smtClean="0"/>
-              <a:t>07-Mar-24</a:t>
+              <a:t>08-Mar-24</a:t>
             </a:fld>
             <a:endParaRPr lang="en-US"/>
           </a:p>
@@ -2640,7 +2641,7 @@
           <a:p>
             <a:fld id="{A35E2E98-A03A-4DC7-9B11-0B5AC1B3BAD8}" type="datetimeFigureOut">
               <a:rPr lang="en-US" smtClean="0"/>
-              <a:t>07-Mar-24</a:t>
+              <a:t>08-Mar-24</a:t>
             </a:fld>
             <a:endParaRPr lang="en-US"/>
           </a:p>
@@ -3022,7 +3023,7 @@
           <a:p>
             <a:fld id="{A35E2E98-A03A-4DC7-9B11-0B5AC1B3BAD8}" type="datetimeFigureOut">
               <a:rPr lang="en-US" smtClean="0"/>
-              <a:t>07-Mar-24</a:t>
+              <a:t>08-Mar-24</a:t>
             </a:fld>
             <a:endParaRPr lang="en-US"/>
           </a:p>
@@ -3309,7 +3310,7 @@
           <a:p>
             <a:fld id="{A35E2E98-A03A-4DC7-9B11-0B5AC1B3BAD8}" type="datetimeFigureOut">
               <a:rPr lang="en-US" smtClean="0"/>
-              <a:t>07-Mar-24</a:t>
+              <a:t>08-Mar-24</a:t>
             </a:fld>
             <a:endParaRPr lang="en-US"/>
           </a:p>
@@ -6443,6 +6444,134 @@
 </p:sld>
 </file>
 
+<file path=ppt/slides/slide26.xml><?xml version="1.0" encoding="utf-8"?>
+<p:sld xmlns:a="http://schemas.openxmlformats.org/drawingml/2006/main" xmlns:r="http://schemas.openxmlformats.org/officeDocument/2006/relationships" xmlns:p="http://schemas.openxmlformats.org/presentationml/2006/main">
+  <p:cSld>
+    <p:spTree>
+      <p:nvGrpSpPr>
+        <p:cNvPr id="1" name=""/>
+        <p:cNvGrpSpPr/>
+        <p:nvPr/>
+      </p:nvGrpSpPr>
+      <p:grpSpPr>
+        <a:xfrm>
+          <a:off x="0" y="0"/>
+          <a:ext cx="0" cy="0"/>
+          <a:chOff x="0" y="0"/>
+          <a:chExt cx="0" cy="0"/>
+        </a:xfrm>
+      </p:grpSpPr>
+      <p:sp>
+        <p:nvSpPr>
+          <p:cNvPr id="2" name="Title 1">
+            <a:extLst>
+              <a:ext uri="{FF2B5EF4-FFF2-40B4-BE49-F238E27FC236}">
+                <a16:creationId xmlns:a16="http://schemas.microsoft.com/office/drawing/2014/main" id="{E929DBD5-3237-28BD-C3BD-1CC28FF16EBC}"/>
+              </a:ext>
+            </a:extLst>
+          </p:cNvPr>
+          <p:cNvSpPr>
+            <a:spLocks noGrp="1"/>
+          </p:cNvSpPr>
+          <p:nvPr>
+            <p:ph type="title"/>
+          </p:nvPr>
+        </p:nvSpPr>
+        <p:spPr/>
+        <p:txBody>
+          <a:bodyPr/>
+          <a:lstStyle/>
+          <a:p>
+            <a:r>
+              <a:rPr lang="en-US" b="1" dirty="0">
+                <a:solidFill>
+                  <a:srgbClr val="FF0000"/>
+                </a:solidFill>
+                <a:ea typeface="Cambria" panose="02040503050406030204" pitchFamily="18" charset="0"/>
+              </a:rPr>
+              <a:t>Delegates</a:t>
+            </a:r>
+          </a:p>
+        </p:txBody>
+      </p:sp>
+      <p:sp>
+        <p:nvSpPr>
+          <p:cNvPr id="3" name="Content Placeholder 2">
+            <a:extLst>
+              <a:ext uri="{FF2B5EF4-FFF2-40B4-BE49-F238E27FC236}">
+                <a16:creationId xmlns:a16="http://schemas.microsoft.com/office/drawing/2014/main" id="{4E5DF1B6-2300-1E04-4C3B-79087D7D0045}"/>
+              </a:ext>
+            </a:extLst>
+          </p:cNvPr>
+          <p:cNvSpPr>
+            <a:spLocks noGrp="1"/>
+          </p:cNvSpPr>
+          <p:nvPr>
+            <p:ph idx="1"/>
+          </p:nvPr>
+        </p:nvSpPr>
+        <p:spPr/>
+        <p:txBody>
+          <a:bodyPr>
+            <a:normAutofit/>
+          </a:bodyPr>
+          <a:lstStyle/>
+          <a:p>
+            <a:pPr lvl="1">
+              <a:buFont typeface="Arial" panose="020B0604020202020204" pitchFamily="34" charset="0"/>
+              <a:buChar char="•"/>
+            </a:pPr>
+            <a:r>
+              <a:rPr lang="en-US" sz="2000" dirty="0"/>
+              <a:t>Generic Delegates</a:t>
+            </a:r>
+          </a:p>
+          <a:p>
+            <a:pPr lvl="2">
+              <a:buFont typeface="Arial" panose="020B0604020202020204" pitchFamily="34" charset="0"/>
+              <a:buChar char="•"/>
+            </a:pPr>
+            <a:r>
+              <a:rPr lang="en-US" sz="1800" dirty="0" err="1"/>
+              <a:t>Func</a:t>
+            </a:r>
+            <a:endParaRPr lang="en-US" sz="1800" dirty="0"/>
+          </a:p>
+          <a:p>
+            <a:pPr lvl="2">
+              <a:buFont typeface="Arial" panose="020B0604020202020204" pitchFamily="34" charset="0"/>
+              <a:buChar char="•"/>
+            </a:pPr>
+            <a:r>
+              <a:rPr lang="en-US" sz="1800" dirty="0"/>
+              <a:t>Action</a:t>
+            </a:r>
+          </a:p>
+          <a:p>
+            <a:pPr lvl="2">
+              <a:buFont typeface="Arial" panose="020B0604020202020204" pitchFamily="34" charset="0"/>
+              <a:buChar char="•"/>
+            </a:pPr>
+            <a:r>
+              <a:rPr lang="en-US" sz="1800" dirty="0"/>
+              <a:t>Predicate</a:t>
+            </a:r>
+          </a:p>
+        </p:txBody>
+      </p:sp>
+    </p:spTree>
+    <p:extLst>
+      <p:ext uri="{BB962C8B-B14F-4D97-AF65-F5344CB8AC3E}">
+        <p14:creationId xmlns:p14="http://schemas.microsoft.com/office/powerpoint/2010/main" val="985629933"/>
+      </p:ext>
+    </p:extLst>
+  </p:cSld>
+  <p:clrMapOvr>
+    <a:masterClrMapping/>
+  </p:clrMapOvr>
+</p:sld>
+</file>
+
 <file path=ppt/slides/slide3.xml><?xml version="1.0" encoding="utf-8"?>
 <p:sld xmlns:a="http://schemas.openxmlformats.org/drawingml/2006/main" xmlns:r="http://schemas.openxmlformats.org/officeDocument/2006/relationships" xmlns:p="http://schemas.openxmlformats.org/presentationml/2006/main">
   <p:cSld>
@@ -7805,20 +7934,20 @@
 </file>
 
 <file path=customXml/item1.xml><?xml version="1.0" encoding="utf-8"?>
-<p:properties xmlns:p="http://schemas.microsoft.com/office/2006/metadata/properties" xmlns:xsi="http://www.w3.org/2001/XMLSchema-instance" xmlns:pc="http://schemas.microsoft.com/office/infopath/2007/PartnerControls">
-  <documentManagement>
-    <_activity xmlns="566b2847-4b6b-412c-8fbd-07bb6b8172bd" xsi:nil="true"/>
-  </documentManagement>
-</p:properties>
-</file>
-
-<file path=customXml/item2.xml><?xml version="1.0" encoding="utf-8"?>
 <?mso-contentType ?>
 <FormTemplates xmlns="http://schemas.microsoft.com/sharepoint/v3/contenttype/forms">
   <Display>DocumentLibraryForm</Display>
   <Edit>DocumentLibraryForm</Edit>
   <New>DocumentLibraryForm</New>
 </FormTemplates>
+</file>
+
+<file path=customXml/item2.xml><?xml version="1.0" encoding="utf-8"?>
+<p:properties xmlns:p="http://schemas.microsoft.com/office/2006/metadata/properties" xmlns:xsi="http://www.w3.org/2001/XMLSchema-instance" xmlns:pc="http://schemas.microsoft.com/office/infopath/2007/PartnerControls">
+  <documentManagement>
+    <_activity xmlns="566b2847-4b6b-412c-8fbd-07bb6b8172bd" xsi:nil="true"/>
+  </documentManagement>
+</p:properties>
 </file>
 
 <file path=customXml/item3.xml><?xml version="1.0" encoding="utf-8"?>
@@ -8075,6 +8204,14 @@
 </file>
 
 <file path=customXml/itemProps1.xml><?xml version="1.0" encoding="utf-8"?>
+<ds:datastoreItem xmlns:ds="http://schemas.openxmlformats.org/officeDocument/2006/customXml" ds:itemID="{69A0BA6B-9DB3-4B70-9A26-0692F72ACC52}">
+  <ds:schemaRefs>
+    <ds:schemaRef ds:uri="http://schemas.microsoft.com/sharepoint/v3/contenttype/forms"/>
+  </ds:schemaRefs>
+</ds:datastoreItem>
+</file>
+
+<file path=customXml/itemProps2.xml><?xml version="1.0" encoding="utf-8"?>
 <ds:datastoreItem xmlns:ds="http://schemas.openxmlformats.org/officeDocument/2006/customXml" ds:itemID="{8C7DF143-C06A-47E7-95B7-EA38AAD4A15F}">
   <ds:schemaRefs>
     <ds:schemaRef ds:uri="99f9aa81-7c22-4edc-9746-523722551add"/>
@@ -8087,14 +8224,6 @@
     <ds:schemaRef ds:uri="http://schemas.microsoft.com/office/2006/metadata/properties"/>
     <ds:schemaRef ds:uri="http://purl.org/dc/dcmitype/"/>
     <ds:schemaRef ds:uri="566b2847-4b6b-412c-8fbd-07bb6b8172bd"/>
-  </ds:schemaRefs>
-</ds:datastoreItem>
-</file>
-
-<file path=customXml/itemProps2.xml><?xml version="1.0" encoding="utf-8"?>
-<ds:datastoreItem xmlns:ds="http://schemas.openxmlformats.org/officeDocument/2006/customXml" ds:itemID="{69A0BA6B-9DB3-4B70-9A26-0692F72ACC52}">
-  <ds:schemaRefs>
-    <ds:schemaRef ds:uri="http://schemas.microsoft.com/sharepoint/v3/contenttype/forms"/>
   </ds:schemaRefs>
 </ds:datastoreItem>
 </file>

</xml_diff>